<commit_message>
Update ppt and app to fix random result and add testing results;
</commit_message>
<xml_diff>
--- a/day4 Group CA proposal (GC) v 1.1.pptx
+++ b/day4 Group CA proposal (GC) v 1.1.pptx
@@ -4248,7 +4248,7 @@
           <a:p>
             <a:r>
               <a:rPr lang="en-US" dirty="0" smtClean="0"/>
-              <a:t>Any other additional comment</a:t>
+              <a:t>Testing</a:t>
             </a:r>
             <a:endParaRPr lang="en-SG" dirty="0"/>
           </a:p>
@@ -4268,6 +4268,36 @@
         <p:txBody>
           <a:bodyPr/>
           <a:lstStyle/>
+          <a:p>
+            <a:r>
+              <a:rPr lang="en-US" dirty="0" smtClean="0"/>
+              <a:t>Training Data Loss RMSE</a:t>
+            </a:r>
+          </a:p>
+          <a:p>
+            <a:endParaRPr lang="en-US" dirty="0" smtClean="0"/>
+          </a:p>
+          <a:p>
+            <a:endParaRPr lang="en-US" dirty="0" smtClean="0"/>
+          </a:p>
+          <a:p>
+            <a:endParaRPr lang="en-US" dirty="0" smtClean="0"/>
+          </a:p>
+          <a:p>
+            <a:r>
+              <a:rPr lang="en-US" dirty="0"/>
+              <a:t>Threshold 166.7</a:t>
+            </a:r>
+          </a:p>
+          <a:p>
+            <a:endParaRPr lang="en-US" dirty="0" smtClean="0"/>
+          </a:p>
+          <a:p>
+            <a:r>
+              <a:rPr lang="en-US" dirty="0" smtClean="0"/>
+              <a:t>Test Data Loss RMSE</a:t>
+            </a:r>
+          </a:p>
           <a:p>
             <a:endParaRPr lang="en-SG" dirty="0"/>
           </a:p>
@@ -4301,6 +4331,54 @@
           </a:p>
         </p:txBody>
       </p:sp>
+      <p:pic>
+        <p:nvPicPr>
+          <p:cNvPr id="7" name="Picture 6"/>
+          <p:cNvPicPr>
+            <a:picLocks noChangeAspect="1"/>
+          </p:cNvPicPr>
+          <p:nvPr/>
+        </p:nvPicPr>
+        <p:blipFill>
+          <a:blip r:embed="rId2"/>
+          <a:stretch>
+            <a:fillRect/>
+          </a:stretch>
+        </p:blipFill>
+        <p:spPr>
+          <a:xfrm>
+            <a:off x="4736250" y="1730585"/>
+            <a:ext cx="3066770" cy="1900127"/>
+          </a:xfrm>
+          <a:prstGeom prst="rect">
+            <a:avLst/>
+          </a:prstGeom>
+        </p:spPr>
+      </p:pic>
+      <p:pic>
+        <p:nvPicPr>
+          <p:cNvPr id="8" name="Picture 7"/>
+          <p:cNvPicPr>
+            <a:picLocks noChangeAspect="1"/>
+          </p:cNvPicPr>
+          <p:nvPr/>
+        </p:nvPicPr>
+        <p:blipFill>
+          <a:blip r:embed="rId3"/>
+          <a:stretch>
+            <a:fillRect/>
+          </a:stretch>
+        </p:blipFill>
+        <p:spPr>
+          <a:xfrm>
+            <a:off x="4736250" y="4099371"/>
+            <a:ext cx="2791968" cy="2000216"/>
+          </a:xfrm>
+          <a:prstGeom prst="rect">
+            <a:avLst/>
+          </a:prstGeom>
+        </p:spPr>
+      </p:pic>
     </p:spTree>
     <p:extLst>
       <p:ext uri="{BB962C8B-B14F-4D97-AF65-F5344CB8AC3E}">

</xml_diff>